<commit_message>
increase subsampled draws to 10,000 for final results
</commit_message>
<xml_diff>
--- a/plots/map.together.legend.edit.pptx
+++ b/plots/map.together.legend.edit.pptx
@@ -2987,7 +2987,7 @@
         </p:nvPicPr>
         <p:blipFill rotWithShape="1">
           <a:blip r:embed="rId2"/>
-          <a:srcRect t="1836" b="84600"/>
+          <a:srcRect t="2143" b="84293"/>
           <a:stretch/>
         </p:blipFill>
         <p:spPr>
@@ -3016,7 +3016,7 @@
         </p:nvPicPr>
         <p:blipFill rotWithShape="1">
           <a:blip r:embed="rId2"/>
-          <a:srcRect l="131" t="22716" r="-131"/>
+          <a:srcRect t="22716"/>
           <a:stretch/>
         </p:blipFill>
         <p:spPr>

</xml_diff>